<commit_message>
feat: add presentation script, mermaid PNGs, and PPTX inspection tools
</commit_message>
<xml_diff>
--- a/output/slides-nwc-labitconf.pptx
+++ b/output/slides-nwc-labitconf.pptx
@@ -15748,6 +15748,44 @@
         <p:nvPr/>
       </p:nvGrpSpPr>
       <p:grpSpPr/>
+      <p:sp>
+        <p:nvSpPr>
+          <p:cNvPr id="2" name="Title 1"/>
+          <p:cNvSpPr>
+            <a:spLocks noGrp="1"/>
+          </p:cNvSpPr>
+          <p:nvPr>
+            <p:ph type="ctrTitle"/>
+          </p:nvPr>
+        </p:nvSpPr>
+        <p:spPr/>
+        <p:txBody>
+          <a:bodyPr/>
+          <a:lstStyle/>
+          <a:p>
+            <a:r>
+              <a:t>NWC para Desarrolladores 🚀</a:t>
+            </a:r>
+          </a:p>
+        </p:txBody>
+      </p:sp>
+      <p:sp>
+        <p:nvSpPr>
+          <p:cNvPr id="3" name="Subtitle 2"/>
+          <p:cNvSpPr>
+            <a:spLocks noGrp="1"/>
+          </p:cNvSpPr>
+          <p:nvPr>
+            <p:ph type="subTitle" idx="1"/>
+          </p:nvPr>
+        </p:nvSpPr>
+        <p:spPr/>
+        <p:txBody>
+          <a:bodyPr/>
+          <a:lstStyle/>
+          <a:p/>
+        </p:txBody>
+      </p:sp>
     </p:spTree>
   </p:cSld>
   <p:clrMapOvr>
@@ -15766,6 +15804,131 @@
         <p:nvPr/>
       </p:nvGrpSpPr>
       <p:grpSpPr/>
+      <p:sp>
+        <p:nvSpPr>
+          <p:cNvPr id="2" name="Title 1"/>
+          <p:cNvSpPr>
+            <a:spLocks noGrp="1"/>
+          </p:cNvSpPr>
+          <p:nvPr>
+            <p:ph type="title"/>
+          </p:nvPr>
+        </p:nvSpPr>
+        <p:spPr/>
+        <p:txBody>
+          <a:bodyPr/>
+          <a:lstStyle/>
+          <a:p>
+            <a:r>
+              <a:t>NIPs Relevantes + Seguridad 🔒</a:t>
+            </a:r>
+          </a:p>
+        </p:txBody>
+      </p:sp>
+      <p:sp>
+        <p:nvSpPr>
+          <p:cNvPr id="3" name="Text Placeholder 2"/>
+          <p:cNvSpPr>
+            <a:spLocks noGrp="1"/>
+          </p:cNvSpPr>
+          <p:nvPr>
+            <p:ph type="body" idx="1"/>
+          </p:nvPr>
+        </p:nvSpPr>
+        <p:spPr/>
+        <p:txBody>
+          <a:bodyPr/>
+          <a:lstStyle/>
+          <a:p>
+            <a:pPr>
+              <a:defRPr b="1" sz="2400"/>
+            </a:pPr>
+            <a:r>
+              <a:t>NIPs Clave</a:t>
+            </a:r>
+          </a:p>
+          <a:p>
+            <a:pPr>
+              <a:defRPr sz="1800"/>
+            </a:pPr>
+            <a:r>
+              <a:t>NIP-47: Nostr Wallet Connect</a:t>
+            </a:r>
+          </a:p>
+          <a:p>
+            <a:pPr>
+              <a:defRPr sz="1800"/>
+            </a:pPr>
+            <a:r>
+              <a:t>NIP-01: Eventos básicos de Nostr</a:t>
+            </a:r>
+          </a:p>
+          <a:p>
+            <a:pPr>
+              <a:defRPr sz="1800"/>
+            </a:pPr>
+            <a:r>
+              <a:t>[NIP-X]: [otro NIP relevante si aplica]</a:t>
+            </a:r>
+          </a:p>
+        </p:txBody>
+      </p:sp>
+      <p:sp>
+        <p:nvSpPr>
+          <p:cNvPr id="4" name="Text Placeholder 3"/>
+          <p:cNvSpPr>
+            <a:spLocks noGrp="1"/>
+          </p:cNvSpPr>
+          <p:nvPr>
+            <p:ph type="body" idx="2"/>
+          </p:nvPr>
+        </p:nvSpPr>
+        <p:spPr/>
+        <p:txBody>
+          <a:bodyPr/>
+          <a:lstStyle/>
+          <a:p>
+            <a:pPr>
+              <a:defRPr b="1" sz="2400"/>
+            </a:pPr>
+            <a:r>
+              <a:t>Seguridad y Buenas Prácticas</a:t>
+            </a:r>
+          </a:p>
+          <a:p>
+            <a:pPr>
+              <a:defRPr sz="1800"/>
+            </a:pPr>
+            <a:r>
+              <a:t>Permisos mínimos necesarios</a:t>
+            </a:r>
+          </a:p>
+          <a:p>
+            <a:pPr>
+              <a:defRPr sz="1800"/>
+            </a:pPr>
+            <a:r>
+              <a:t>Rotación de conexiones</a:t>
+            </a:r>
+          </a:p>
+          <a:p>
+            <a:pPr>
+              <a:defRPr sz="1800"/>
+            </a:pPr>
+            <a:r>
+              <a:t>Monitoreo de actividad</a:t>
+            </a:r>
+          </a:p>
+          <a:p>
+            <a:pPr>
+              <a:defRPr sz="1800"/>
+            </a:pPr>
+            <a:r>
+              <a:t>Revocación inmediata</a:t>
+            </a:r>
+          </a:p>
+        </p:txBody>
+      </p:sp>
     </p:spTree>
   </p:cSld>
   <p:clrMapOvr>
@@ -15784,6 +15947,99 @@
         <p:nvPr/>
       </p:nvGrpSpPr>
       <p:grpSpPr/>
+      <p:sp>
+        <p:nvSpPr>
+          <p:cNvPr id="2" name="Title 1"/>
+          <p:cNvSpPr>
+            <a:spLocks noGrp="1"/>
+          </p:cNvSpPr>
+          <p:nvPr>
+            <p:ph type="title"/>
+          </p:nvPr>
+        </p:nvSpPr>
+        <p:spPr/>
+        <p:txBody>
+          <a:bodyPr/>
+          <a:lstStyle/>
+          <a:p>
+            <a:r>
+              <a:t>IA + MCP: Agentic Engineering 🧠</a:t>
+            </a:r>
+          </a:p>
+        </p:txBody>
+      </p:sp>
+      <p:sp>
+        <p:nvSpPr>
+          <p:cNvPr id="3" name="Text Placeholder 2"/>
+          <p:cNvSpPr>
+            <a:spLocks noGrp="1"/>
+          </p:cNvSpPr>
+          <p:nvPr>
+            <p:ph type="body" idx="1"/>
+          </p:nvPr>
+        </p:nvSpPr>
+        <p:spPr/>
+        <p:txBody>
+          <a:bodyPr/>
+          <a:lstStyle/>
+          <a:p>
+            <a:pPr>
+              <a:defRPr sz="2000"/>
+            </a:pPr>
+            <a:r>
+              <a:t>MCP (Model Context Protocol): orquestación de AI agents con herramientas</a:t>
+            </a:r>
+          </a:p>
+          <a:p>
+            <a:pPr>
+              <a:defRPr sz="2000"/>
+            </a:pPr>
+            <a:r>
+              <a:t>NWC como "herramienta" para agents: pagos automáticos, rewards, micropagos</a:t>
+            </a:r>
+          </a:p>
+          <a:p>
+            <a:pPr>
+              <a:defRPr sz="2000"/>
+            </a:pPr>
+            <a:r>
+              <a:t>Casos de uso: asistentes con presupuesto, bots autónomos, workflows complejos</a:t>
+            </a:r>
+          </a:p>
+          <a:p>
+            <a:pPr>
+              <a:defRPr sz="2000"/>
+            </a:pPr>
+            <a:r>
+              <a:t>Ejemplo: agent que paga por APIs, servicios, datos en tiempo real</a:t>
+            </a:r>
+          </a:p>
+        </p:txBody>
+      </p:sp>
+      <p:pic>
+        <p:nvPicPr>
+          <p:cNvPr id="4" name="Picture 3" descr="architecture-nwc-mcp.png"/>
+          <p:cNvPicPr>
+            <a:picLocks noChangeAspect="1"/>
+          </p:cNvPicPr>
+          <p:nvPr/>
+        </p:nvPicPr>
+        <p:blipFill>
+          <a:blip r:embed="rId3"/>
+          <a:stretch>
+            <a:fillRect/>
+          </a:stretch>
+        </p:blipFill>
+        <p:spPr>
+          <a:xfrm>
+            <a:off x="914400" y="3657600"/>
+            <a:ext cx="7772400" cy="7344391"/>
+          </a:xfrm>
+          <a:prstGeom prst="rect">
+            <a:avLst/>
+          </a:prstGeom>
+        </p:spPr>
+      </p:pic>
     </p:spTree>
   </p:cSld>
   <p:clrMapOvr>
@@ -15802,6 +16058,147 @@
         <p:nvPr/>
       </p:nvGrpSpPr>
       <p:grpSpPr/>
+      <p:sp>
+        <p:nvSpPr>
+          <p:cNvPr id="2" name="Title 1"/>
+          <p:cNvSpPr>
+            <a:spLocks noGrp="1"/>
+          </p:cNvSpPr>
+          <p:nvPr>
+            <p:ph type="title"/>
+          </p:nvPr>
+        </p:nvSpPr>
+        <p:spPr/>
+        <p:txBody>
+          <a:bodyPr/>
+          <a:lstStyle/>
+          <a:p>
+            <a:r>
+              <a:t>Cómo Empezar Hoy 📫</a:t>
+            </a:r>
+          </a:p>
+        </p:txBody>
+      </p:sp>
+      <p:sp>
+        <p:nvSpPr>
+          <p:cNvPr id="3" name="Text Placeholder 2"/>
+          <p:cNvSpPr>
+            <a:spLocks noGrp="1"/>
+          </p:cNvSpPr>
+          <p:nvPr>
+            <p:ph type="body" idx="1"/>
+          </p:nvPr>
+        </p:nvSpPr>
+        <p:spPr/>
+        <p:txBody>
+          <a:bodyPr/>
+          <a:lstStyle/>
+          <a:p>
+            <a:pPr>
+              <a:defRPr sz="2000"/>
+            </a:pPr>
+            <a:r>
+              <a:t>Documentación NIP-47: [enlace o QR]</a:t>
+            </a:r>
+          </a:p>
+          <a:p>
+            <a:pPr>
+              <a:defRPr sz="2000"/>
+            </a:pPr>
+            <a:r>
+              <a:t>Alby Hub: Prueba NWC gratis (auto-hospedado)</a:t>
+            </a:r>
+          </a:p>
+          <a:p>
+            <a:pPr>
+              <a:defRPr sz="2000"/>
+            </a:pPr>
+            <a:r>
+              <a:t>Repo de ejemplos: [enlace a GitHub con integraciones]</a:t>
+            </a:r>
+          </a:p>
+          <a:p>
+            <a:pPr>
+              <a:defRPr sz="2000"/>
+            </a:pPr>
+            <a:r>
+              <a:t>Comunidad: [Nostr, Telegram, Discord]</a:t>
+            </a:r>
+          </a:p>
+        </p:txBody>
+      </p:sp>
+      <p:pic>
+        <p:nvPicPr>
+          <p:cNvPr id="4" name="Picture 3" descr="qr-nip47.png"/>
+          <p:cNvPicPr>
+            <a:picLocks noChangeAspect="1"/>
+          </p:cNvPicPr>
+          <p:nvPr/>
+        </p:nvPicPr>
+        <p:blipFill>
+          <a:blip r:embed="rId3"/>
+          <a:stretch>
+            <a:fillRect/>
+          </a:stretch>
+        </p:blipFill>
+        <p:spPr>
+          <a:xfrm>
+            <a:off x="1371600" y="4114800"/>
+            <a:ext cx="1371600" cy="1371600"/>
+          </a:xfrm>
+          <a:prstGeom prst="rect">
+            <a:avLst/>
+          </a:prstGeom>
+        </p:spPr>
+      </p:pic>
+      <p:pic>
+        <p:nvPicPr>
+          <p:cNvPr id="5" name="Picture 4" descr="qr-alby.png"/>
+          <p:cNvPicPr>
+            <a:picLocks noChangeAspect="1"/>
+          </p:cNvPicPr>
+          <p:nvPr/>
+        </p:nvPicPr>
+        <p:blipFill>
+          <a:blip r:embed="rId4"/>
+          <a:stretch>
+            <a:fillRect/>
+          </a:stretch>
+        </p:blipFill>
+        <p:spPr>
+          <a:xfrm>
+            <a:off x="3657600" y="4114800"/>
+            <a:ext cx="1371600" cy="1371600"/>
+          </a:xfrm>
+          <a:prstGeom prst="rect">
+            <a:avLst/>
+          </a:prstGeom>
+        </p:spPr>
+      </p:pic>
+      <p:pic>
+        <p:nvPicPr>
+          <p:cNvPr id="6" name="Picture 5" descr="qr-nostr.png"/>
+          <p:cNvPicPr>
+            <a:picLocks noChangeAspect="1"/>
+          </p:cNvPicPr>
+          <p:nvPr/>
+        </p:nvPicPr>
+        <p:blipFill>
+          <a:blip r:embed="rId5"/>
+          <a:stretch>
+            <a:fillRect/>
+          </a:stretch>
+        </p:blipFill>
+        <p:spPr>
+          <a:xfrm>
+            <a:off x="5943600" y="4114800"/>
+            <a:ext cx="1371600" cy="1371600"/>
+          </a:xfrm>
+          <a:prstGeom prst="rect">
+            <a:avLst/>
+          </a:prstGeom>
+        </p:spPr>
+      </p:pic>
     </p:spTree>
   </p:cSld>
   <p:clrMapOvr>
@@ -15820,6 +16217,83 @@
         <p:nvPr/>
       </p:nvGrpSpPr>
       <p:grpSpPr/>
+      <p:sp>
+        <p:nvSpPr>
+          <p:cNvPr id="2" name="Title 1"/>
+          <p:cNvSpPr>
+            <a:spLocks noGrp="1"/>
+          </p:cNvSpPr>
+          <p:nvPr>
+            <p:ph type="title"/>
+          </p:nvPr>
+        </p:nvSpPr>
+        <p:spPr/>
+        <p:txBody>
+          <a:bodyPr/>
+          <a:lstStyle/>
+          <a:p>
+            <a:r>
+              <a:t>Metadata General</a:t>
+            </a:r>
+          </a:p>
+        </p:txBody>
+      </p:sp>
+      <p:sp>
+        <p:nvSpPr>
+          <p:cNvPr id="3" name="Text Placeholder 2"/>
+          <p:cNvSpPr>
+            <a:spLocks noGrp="1"/>
+          </p:cNvSpPr>
+          <p:nvPr>
+            <p:ph type="body" idx="1"/>
+          </p:nvPr>
+        </p:nvSpPr>
+        <p:spPr/>
+        <p:txBody>
+          <a:bodyPr/>
+          <a:lstStyle/>
+          <a:p>
+            <a:pPr>
+              <a:defRPr sz="2000"/>
+            </a:pPr>
+            <a:r>
+              <a:t>Duración objetivo: 15 minutos</a:t>
+            </a:r>
+          </a:p>
+          <a:p>
+            <a:pPr>
+              <a:defRPr sz="2000"/>
+            </a:pPr>
+            <a:r>
+              <a:t>Total de slides: 12</a:t>
+            </a:r>
+          </a:p>
+          <a:p>
+            <a:pPr>
+              <a:defRPr sz="2000"/>
+            </a:pPr>
+            <a:r>
+              <a:t>Formato final: PPTX, 1920x1080, &lt;15MB</a:t>
+            </a:r>
+          </a:p>
+          <a:p>
+            <a:pPr>
+              <a:defRPr sz="2000"/>
+            </a:pPr>
+            <a:r>
+              <a:t>Paleta de emojis: 🚀 😬 ⏱️ 🧩 💳 🌎 🌍 🔗 🏆 🔒 🧠 📫</a:t>
+            </a:r>
+          </a:p>
+          <a:p>
+            <a:pPr>
+              <a:defRPr sz="2000"/>
+            </a:pPr>
+            <a:r>
+              <a:t>Fuentes a citar: Mínimo 2-3 referencias verificables en slides de problema/adopción</a:t>
+            </a:r>
+          </a:p>
+        </p:txBody>
+      </p:sp>
     </p:spTree>
   </p:cSld>
   <p:clrMapOvr>
@@ -15838,6 +16312,75 @@
         <p:nvPr/>
       </p:nvGrpSpPr>
       <p:grpSpPr/>
+      <p:sp>
+        <p:nvSpPr>
+          <p:cNvPr id="2" name="Title 1"/>
+          <p:cNvSpPr>
+            <a:spLocks noGrp="1"/>
+          </p:cNvSpPr>
+          <p:nvPr>
+            <p:ph type="title"/>
+          </p:nvPr>
+        </p:nvSpPr>
+        <p:spPr/>
+        <p:txBody>
+          <a:bodyPr/>
+          <a:lstStyle/>
+          <a:p>
+            <a:r>
+              <a:t>El problema 😬</a:t>
+            </a:r>
+          </a:p>
+        </p:txBody>
+      </p:sp>
+      <p:sp>
+        <p:nvSpPr>
+          <p:cNvPr id="3" name="Text Placeholder 2"/>
+          <p:cNvSpPr>
+            <a:spLocks noGrp="1"/>
+          </p:cNvSpPr>
+          <p:nvPr>
+            <p:ph type="body" idx="1"/>
+          </p:nvPr>
+        </p:nvSpPr>
+        <p:spPr/>
+        <p:txBody>
+          <a:bodyPr/>
+          <a:lstStyle/>
+          <a:p>
+            <a:pPr>
+              <a:defRPr sz="2000"/>
+            </a:pPr>
+            <a:r>
+              <a:t>Las billeteras Lightning requieren custodia total o gestión compleja de nodos</a:t>
+            </a:r>
+          </a:p>
+          <a:p>
+            <a:pPr>
+              <a:defRPr sz="2000"/>
+            </a:pPr>
+            <a:r>
+              <a:t>Los usuarios no pueden delegar permisos granulares para pagos automáticos</a:t>
+            </a:r>
+          </a:p>
+          <a:p>
+            <a:pPr>
+              <a:defRPr sz="2000"/>
+            </a:pPr>
+            <a:r>
+              <a:t>Las aplicaciones necesitan acceso completo a fondos o implementaciones custom</a:t>
+            </a:r>
+          </a:p>
+          <a:p>
+            <a:pPr>
+              <a:defRPr sz="2000"/>
+            </a:pPr>
+            <a:r>
+              <a:t>Resultado: fricción en adopción, riesgos de seguridad, experiencia fragmentada</a:t>
+            </a:r>
+          </a:p>
+        </p:txBody>
+      </p:sp>
     </p:spTree>
   </p:cSld>
   <p:clrMapOvr>
@@ -15856,6 +16399,75 @@
         <p:nvPr/>
       </p:nvGrpSpPr>
       <p:grpSpPr/>
+      <p:sp>
+        <p:nvSpPr>
+          <p:cNvPr id="2" name="Title 1"/>
+          <p:cNvSpPr>
+            <a:spLocks noGrp="1"/>
+          </p:cNvSpPr>
+          <p:nvPr>
+            <p:ph type="title"/>
+          </p:nvPr>
+        </p:nvSpPr>
+        <p:spPr/>
+        <p:txBody>
+          <a:bodyPr/>
+          <a:lstStyle/>
+          <a:p>
+            <a:r>
+              <a:t>¿Por qué NWC ahora? ⏱️</a:t>
+            </a:r>
+          </a:p>
+        </p:txBody>
+      </p:sp>
+      <p:sp>
+        <p:nvSpPr>
+          <p:cNvPr id="3" name="Text Placeholder 2"/>
+          <p:cNvSpPr>
+            <a:spLocks noGrp="1"/>
+          </p:cNvSpPr>
+          <p:nvPr>
+            <p:ph type="body" idx="1"/>
+          </p:nvPr>
+        </p:nvSpPr>
+        <p:spPr/>
+        <p:txBody>
+          <a:bodyPr/>
+          <a:lstStyle/>
+          <a:p>
+            <a:pPr>
+              <a:defRPr sz="2000"/>
+            </a:pPr>
+            <a:r>
+              <a:t>Lightning alcanzó madurez técnica pero falta UX accesible</a:t>
+            </a:r>
+          </a:p>
+          <a:p>
+            <a:pPr>
+              <a:defRPr sz="2000"/>
+            </a:pPr>
+            <a:r>
+              <a:t>Proliferación de casos de uso: suscripciones, micropagos, bots, IA agents</a:t>
+            </a:r>
+          </a:p>
+          <a:p>
+            <a:pPr>
+              <a:defRPr sz="2000"/>
+            </a:pPr>
+            <a:r>
+              <a:t>Necesidad de interoperabilidad entre wallets y aplicaciones</a:t>
+            </a:r>
+          </a:p>
+          <a:p>
+            <a:pPr>
+              <a:defRPr sz="2000"/>
+            </a:pPr>
+            <a:r>
+              <a:t>Nostr ofrece infraestructura descentralizada lista para usar</a:t>
+            </a:r>
+          </a:p>
+        </p:txBody>
+      </p:sp>
     </p:spTree>
   </p:cSld>
   <p:clrMapOvr>
@@ -15874,6 +16486,99 @@
         <p:nvPr/>
       </p:nvGrpSpPr>
       <p:grpSpPr/>
+      <p:sp>
+        <p:nvSpPr>
+          <p:cNvPr id="2" name="Title 1"/>
+          <p:cNvSpPr>
+            <a:spLocks noGrp="1"/>
+          </p:cNvSpPr>
+          <p:nvPr>
+            <p:ph type="title"/>
+          </p:nvPr>
+        </p:nvSpPr>
+        <p:spPr/>
+        <p:txBody>
+          <a:bodyPr/>
+          <a:lstStyle/>
+          <a:p>
+            <a:r>
+              <a:t>Qué es NWC 🧩</a:t>
+            </a:r>
+          </a:p>
+        </p:txBody>
+      </p:sp>
+      <p:sp>
+        <p:nvSpPr>
+          <p:cNvPr id="3" name="Text Placeholder 2"/>
+          <p:cNvSpPr>
+            <a:spLocks noGrp="1"/>
+          </p:cNvSpPr>
+          <p:nvPr>
+            <p:ph type="body" idx="1"/>
+          </p:nvPr>
+        </p:nvSpPr>
+        <p:spPr/>
+        <p:txBody>
+          <a:bodyPr/>
+          <a:lstStyle/>
+          <a:p>
+            <a:pPr>
+              <a:defRPr sz="2000"/>
+            </a:pPr>
+            <a:r>
+              <a:t>Nostr Wallet Connect: protocolo para delegar acceso a wallets Lightning</a:t>
+            </a:r>
+          </a:p>
+          <a:p>
+            <a:pPr>
+              <a:defRPr sz="2000"/>
+            </a:pPr>
+            <a:r>
+              <a:t>Basado en Nostr (NIP-47): eventos firmados, relays descentralizados</a:t>
+            </a:r>
+          </a:p>
+          <a:p>
+            <a:pPr>
+              <a:defRPr sz="2000"/>
+            </a:pPr>
+            <a:r>
+              <a:t>Permisos granulares: límites de monto, tipo de operación, tiempo</a:t>
+            </a:r>
+          </a:p>
+          <a:p>
+            <a:pPr>
+              <a:defRPr sz="2000"/>
+            </a:pPr>
+            <a:r>
+              <a:t>Interoperable: cualquier wallet + cualquier app que implemente el protocolo</a:t>
+            </a:r>
+          </a:p>
+        </p:txBody>
+      </p:sp>
+      <p:pic>
+        <p:nvPicPr>
+          <p:cNvPr id="4" name="Picture 3" descr="nwc-simple-flow.png"/>
+          <p:cNvPicPr>
+            <a:picLocks noChangeAspect="1"/>
+          </p:cNvPicPr>
+          <p:nvPr/>
+        </p:nvPicPr>
+        <p:blipFill>
+          <a:blip r:embed="rId3"/>
+          <a:stretch>
+            <a:fillRect/>
+          </a:stretch>
+        </p:blipFill>
+        <p:spPr>
+          <a:xfrm>
+            <a:off x="6400800" y="3200400"/>
+            <a:ext cx="5029200" cy="757321"/>
+          </a:xfrm>
+          <a:prstGeom prst="rect">
+            <a:avLst/>
+          </a:prstGeom>
+        </p:spPr>
+      </p:pic>
     </p:spTree>
   </p:cSld>
   <p:clrMapOvr>
@@ -15892,6 +16597,139 @@
         <p:nvPr/>
       </p:nvGrpSpPr>
       <p:grpSpPr/>
+      <p:sp>
+        <p:nvSpPr>
+          <p:cNvPr id="2" name="Title 1"/>
+          <p:cNvSpPr>
+            <a:spLocks noGrp="1"/>
+          </p:cNvSpPr>
+          <p:nvPr>
+            <p:ph type="title"/>
+          </p:nvPr>
+        </p:nvSpPr>
+        <p:spPr/>
+        <p:txBody>
+          <a:bodyPr/>
+          <a:lstStyle/>
+          <a:p>
+            <a:r>
+              <a:t>Suscripciones y Subcuentas 💳</a:t>
+            </a:r>
+          </a:p>
+        </p:txBody>
+      </p:sp>
+      <p:sp>
+        <p:nvSpPr>
+          <p:cNvPr id="3" name="Text Placeholder 2"/>
+          <p:cNvSpPr>
+            <a:spLocks noGrp="1"/>
+          </p:cNvSpPr>
+          <p:nvPr>
+            <p:ph type="body" idx="1"/>
+          </p:nvPr>
+        </p:nvSpPr>
+        <p:spPr/>
+        <p:txBody>
+          <a:bodyPr/>
+          <a:lstStyle/>
+          <a:p>
+            <a:pPr>
+              <a:defRPr b="1" sz="2400"/>
+            </a:pPr>
+            <a:r>
+              <a:t>Suscripciones</a:t>
+            </a:r>
+          </a:p>
+          <a:p>
+            <a:pPr>
+              <a:defRPr sz="1800"/>
+            </a:pPr>
+            <a:r>
+              <a:t>Pagos recurrentes automatizados</a:t>
+            </a:r>
+          </a:p>
+          <a:p>
+            <a:pPr>
+              <a:defRPr sz="1800"/>
+            </a:pPr>
+            <a:r>
+              <a:t>Límites mensuales configurables</a:t>
+            </a:r>
+          </a:p>
+          <a:p>
+            <a:pPr>
+              <a:defRPr sz="1800"/>
+            </a:pPr>
+            <a:r>
+              <a:t>Cancelación inmediata por el usuario</a:t>
+            </a:r>
+          </a:p>
+          <a:p>
+            <a:pPr>
+              <a:defRPr sz="1800"/>
+            </a:pPr>
+            <a:r>
+              <a:t>Sin intermediarios ni custodia</a:t>
+            </a:r>
+          </a:p>
+        </p:txBody>
+      </p:sp>
+      <p:sp>
+        <p:nvSpPr>
+          <p:cNvPr id="4" name="Text Placeholder 3"/>
+          <p:cNvSpPr>
+            <a:spLocks noGrp="1"/>
+          </p:cNvSpPr>
+          <p:nvPr>
+            <p:ph type="body" idx="2"/>
+          </p:nvPr>
+        </p:nvSpPr>
+        <p:spPr/>
+        <p:txBody>
+          <a:bodyPr/>
+          <a:lstStyle/>
+          <a:p>
+            <a:pPr>
+              <a:defRPr b="1" sz="2400"/>
+            </a:pPr>
+            <a:r>
+              <a:t>Subcuentas / Wallets secundarias</a:t>
+            </a:r>
+          </a:p>
+          <a:p>
+            <a:pPr>
+              <a:defRPr sz="1800"/>
+            </a:pPr>
+            <a:r>
+              <a:t>Presupuestos por categoría (ej: gaming, zaps, donaciones)</a:t>
+            </a:r>
+          </a:p>
+          <a:p>
+            <a:pPr>
+              <a:defRPr sz="1800"/>
+            </a:pPr>
+            <a:r>
+              <a:t>Control parental o de equipo</a:t>
+            </a:r>
+          </a:p>
+          <a:p>
+            <a:pPr>
+              <a:defRPr sz="1800"/>
+            </a:pPr>
+            <a:r>
+              <a:t>Delegación temporal de fondos</a:t>
+            </a:r>
+          </a:p>
+          <a:p>
+            <a:pPr>
+              <a:defRPr sz="1800"/>
+            </a:pPr>
+            <a:r>
+              <a:t>Separación de riesgos</a:t>
+            </a:r>
+          </a:p>
+        </p:txBody>
+      </p:sp>
     </p:spTree>
   </p:cSld>
   <p:clrMapOvr>
@@ -15910,6 +16748,75 @@
         <p:nvPr/>
       </p:nvGrpSpPr>
       <p:grpSpPr/>
+      <p:sp>
+        <p:nvSpPr>
+          <p:cNvPr id="2" name="Title 1"/>
+          <p:cNvSpPr>
+            <a:spLocks noGrp="1"/>
+          </p:cNvSpPr>
+          <p:nvPr>
+            <p:ph type="title"/>
+          </p:nvPr>
+        </p:nvSpPr>
+        <p:spPr/>
+        <p:txBody>
+          <a:bodyPr/>
+          <a:lstStyle/>
+          <a:p>
+            <a:r>
+              <a:t>Adopción en Argentina / LatAm 🌎</a:t>
+            </a:r>
+          </a:p>
+        </p:txBody>
+      </p:sp>
+      <p:sp>
+        <p:nvSpPr>
+          <p:cNvPr id="3" name="Text Placeholder 2"/>
+          <p:cNvSpPr>
+            <a:spLocks noGrp="1"/>
+          </p:cNvSpPr>
+          <p:nvPr>
+            <p:ph type="body" idx="1"/>
+          </p:nvPr>
+        </p:nvSpPr>
+        <p:spPr/>
+        <p:txBody>
+          <a:bodyPr/>
+          <a:lstStyle/>
+          <a:p>
+            <a:pPr>
+              <a:defRPr sz="2000"/>
+            </a:pPr>
+            <a:r>
+              <a:t>LaWallet (Argentina): Wallet Lightning con tarjeta de débito, POS y BoltCard - presentado en bitcoin++ BA 2024</a:t>
+            </a:r>
+          </a:p>
+          <a:p>
+            <a:pPr>
+              <a:defRPr sz="2000"/>
+            </a:pPr>
+            <a:r>
+              <a:t>Francisco Calderon (Argentina): Bot Telegram con Lightning y plataforma exchange en Nostr</a:t>
+            </a:r>
+          </a:p>
+          <a:p>
+            <a:pPr>
+              <a:defRPr sz="2000"/>
+            </a:pPr>
+            <a:r>
+              <a:t>Swapido (México): Conversión Lightning → Pesos mexicanos con un clic</a:t>
+            </a:r>
+          </a:p>
+          <a:p>
+            <a:pPr>
+              <a:defRPr sz="2000"/>
+            </a:pPr>
+            <a:r>
+              <a:t>Bitcoin Argentina NGO: Cursos de Lightning Network para la comunidad</a:t>
+            </a:r>
+          </a:p>
+        </p:txBody>
+      </p:sp>
     </p:spTree>
   </p:cSld>
   <p:clrMapOvr>
@@ -15928,6 +16835,75 @@
         <p:nvPr/>
       </p:nvGrpSpPr>
       <p:grpSpPr/>
+      <p:sp>
+        <p:nvSpPr>
+          <p:cNvPr id="2" name="Title 1"/>
+          <p:cNvSpPr>
+            <a:spLocks noGrp="1"/>
+          </p:cNvSpPr>
+          <p:nvPr>
+            <p:ph type="title"/>
+          </p:nvPr>
+        </p:nvSpPr>
+        <p:spPr/>
+        <p:txBody>
+          <a:bodyPr/>
+          <a:lstStyle/>
+          <a:p>
+            <a:r>
+              <a:t>Adopción Internacional 🌍</a:t>
+            </a:r>
+          </a:p>
+        </p:txBody>
+      </p:sp>
+      <p:sp>
+        <p:nvSpPr>
+          <p:cNvPr id="3" name="Text Placeholder 2"/>
+          <p:cNvSpPr>
+            <a:spLocks noGrp="1"/>
+          </p:cNvSpPr>
+          <p:nvPr>
+            <p:ph type="body" idx="1"/>
+          </p:nvPr>
+        </p:nvSpPr>
+        <p:spPr/>
+        <p:txBody>
+          <a:bodyPr/>
+          <a:lstStyle/>
+          <a:p>
+            <a:pPr>
+              <a:defRPr sz="2000"/>
+            </a:pPr>
+            <a:r>
+              <a:t>Alby: Extensión de navegador, hub auto-hospedado, sponsor de hackathons NWC</a:t>
+            </a:r>
+          </a:p>
+          <a:p>
+            <a:pPr>
+              <a:defRPr sz="2000"/>
+            </a:pPr>
+            <a:r>
+              <a:t>Prism (Discord): Bot de zaps para Discord - envía cientos de pagos con un clic</a:t>
+            </a:r>
+          </a:p>
+          <a:p>
+            <a:pPr>
+              <a:defRPr sz="2000"/>
+            </a:pPr>
+            <a:r>
+              <a:t>ThunderTip (Telegram): Bot no-custodial - pagos directos wallet-a-wallet</a:t>
+            </a:r>
+          </a:p>
+          <a:p>
+            <a:pPr>
+              <a:defRPr sz="2000"/>
+            </a:pPr>
+            <a:r>
+              <a:t>BTCPayServer: Integración NWC para comerciantes - aceptar pagos en múltiples wallets</a:t>
+            </a:r>
+          </a:p>
+        </p:txBody>
+      </p:sp>
     </p:spTree>
   </p:cSld>
   <p:clrMapOvr>
@@ -15946,6 +16922,75 @@
         <p:nvPr/>
       </p:nvGrpSpPr>
       <p:grpSpPr/>
+      <p:sp>
+        <p:nvSpPr>
+          <p:cNvPr id="2" name="Title 1"/>
+          <p:cNvSpPr>
+            <a:spLocks noGrp="1"/>
+          </p:cNvSpPr>
+          <p:nvPr>
+            <p:ph type="title"/>
+          </p:nvPr>
+        </p:nvSpPr>
+        <p:spPr/>
+        <p:txBody>
+          <a:bodyPr/>
+          <a:lstStyle/>
+          <a:p>
+            <a:r>
+              <a:t>Integraciones y Ecosistema 🔗</a:t>
+            </a:r>
+          </a:p>
+        </p:txBody>
+      </p:sp>
+      <p:sp>
+        <p:nvSpPr>
+          <p:cNvPr id="3" name="Text Placeholder 2"/>
+          <p:cNvSpPr>
+            <a:spLocks noGrp="1"/>
+          </p:cNvSpPr>
+          <p:nvPr>
+            <p:ph type="body" idx="1"/>
+          </p:nvPr>
+        </p:nvSpPr>
+        <p:spPr/>
+        <p:txBody>
+          <a:bodyPr/>
+          <a:lstStyle/>
+          <a:p>
+            <a:pPr>
+              <a:defRPr sz="2000"/>
+            </a:pPr>
+            <a:r>
+              <a:t>Discord/Telegram bots: Prism (Discord), ThunderTip (Telegram) - tips y pagos en grupos</a:t>
+            </a:r>
+          </a:p>
+          <a:p>
+            <a:pPr>
+              <a:defRPr sz="2000"/>
+            </a:pPr>
+            <a:r>
+              <a:t>Web apps: Dashboards, analytics, servicios SaaS con micropagos automáticos</a:t>
+            </a:r>
+          </a:p>
+          <a:p>
+            <a:pPr>
+              <a:defRPr sz="2000"/>
+            </a:pPr>
+            <a:r>
+              <a:t>Backends: LNbits con extensión NWC, BTCPayServer con plugin Nostr/NIP-47</a:t>
+            </a:r>
+          </a:p>
+          <a:p>
+            <a:pPr>
+              <a:defRPr sz="2000"/>
+            </a:pPr>
+            <a:r>
+              <a:t>Recursos dev: awesome-nwc en GitHub - lista curada de proyectos e integraciones</a:t>
+            </a:r>
+          </a:p>
+        </p:txBody>
+      </p:sp>
     </p:spTree>
   </p:cSld>
   <p:clrMapOvr>
@@ -15964,6 +17009,75 @@
         <p:nvPr/>
       </p:nvGrpSpPr>
       <p:grpSpPr/>
+      <p:sp>
+        <p:nvSpPr>
+          <p:cNvPr id="2" name="Title 1"/>
+          <p:cNvSpPr>
+            <a:spLocks noGrp="1"/>
+          </p:cNvSpPr>
+          <p:nvPr>
+            <p:ph type="title"/>
+          </p:nvPr>
+        </p:nvSpPr>
+        <p:spPr/>
+        <p:txBody>
+          <a:bodyPr/>
+          <a:lstStyle/>
+          <a:p>
+            <a:r>
+              <a:t>BTCPayServer + Mi Proyecto 🏆</a:t>
+            </a:r>
+          </a:p>
+        </p:txBody>
+      </p:sp>
+      <p:sp>
+        <p:nvSpPr>
+          <p:cNvPr id="3" name="Text Placeholder 2"/>
+          <p:cNvSpPr>
+            <a:spLocks noGrp="1"/>
+          </p:cNvSpPr>
+          <p:nvPr>
+            <p:ph type="body" idx="1"/>
+          </p:nvPr>
+        </p:nvSpPr>
+        <p:spPr/>
+        <p:txBody>
+          <a:bodyPr/>
+          <a:lstStyle/>
+          <a:p>
+            <a:pPr>
+              <a:defRPr sz="2000"/>
+            </a:pPr>
+            <a:r>
+              <a:t>Gané Geyser NWC Hackathon ($10k, sponsors: Alby, Flash, Primal, BTC Curacão)</a:t>
+            </a:r>
+          </a:p>
+          <a:p>
+            <a:pPr>
+              <a:defRPr sz="2000"/>
+            </a:pPr>
+            <a:r>
+              <a:t>Proyecto: Suscripciones NWC en BTCPayServer</a:t>
+            </a:r>
+          </a:p>
+          <a:p>
+            <a:pPr>
+              <a:defRPr sz="2000"/>
+            </a:pPr>
+            <a:r>
+              <a:t>Permite a comerciantes ofrecer suscripciones Lightning sin custodia</a:t>
+            </a:r>
+          </a:p>
+          <a:p>
+            <a:pPr>
+              <a:defRPr sz="2000"/>
+            </a:pPr>
+            <a:r>
+              <a:t>Backend neutral, open source, enfoque en soberanía del usuario</a:t>
+            </a:r>
+          </a:p>
+        </p:txBody>
+      </p:sp>
     </p:spTree>
   </p:cSld>
   <p:clrMapOvr>

</xml_diff>